<commit_message>
notes for oop day
</commit_message>
<xml_diff>
--- a/ClassMaterials/OOP/09-OOP-202120.pptx
+++ b/ClassMaterials/OOP/09-OOP-202120.pptx
@@ -177,6 +177,30 @@
 
 <file path=ppt/changesInfos/changesInfo1.xml><?xml version="1.0" encoding="utf-8"?>
 <pc:chgInfo xmlns:a="http://schemas.openxmlformats.org/drawingml/2006/main" xmlns:r="http://schemas.openxmlformats.org/officeDocument/2006/relationships" xmlns:ac="http://schemas.microsoft.com/office/drawing/2013/main/command" xmlns:pc="http://schemas.microsoft.com/office/powerpoint/2013/main/command">
+  <pc:docChgLst>
+    <pc:chgData name="Hewner, Mike" userId="7f3f83dd-6dfb-4127-a87f-c1714bd4fac9" providerId="ADAL" clId="{AFF27697-9E3A-4005-950E-2DF0D8510B4B}"/>
+    <pc:docChg chg="modSld">
+      <pc:chgData name="Hewner, Mike" userId="7f3f83dd-6dfb-4127-a87f-c1714bd4fac9" providerId="ADAL" clId="{AFF27697-9E3A-4005-950E-2DF0D8510B4B}" dt="2022-12-12T17:56:16.839" v="0" actId="20577"/>
+      <pc:docMkLst>
+        <pc:docMk/>
+      </pc:docMkLst>
+      <pc:sldChg chg="modSp mod">
+        <pc:chgData name="Hewner, Mike" userId="7f3f83dd-6dfb-4127-a87f-c1714bd4fac9" providerId="ADAL" clId="{AFF27697-9E3A-4005-950E-2DF0D8510B4B}" dt="2022-12-12T17:56:16.839" v="0" actId="20577"/>
+        <pc:sldMkLst>
+          <pc:docMk/>
+          <pc:sldMk cId="0" sldId="257"/>
+        </pc:sldMkLst>
+        <pc:spChg chg="mod">
+          <ac:chgData name="Hewner, Mike" userId="7f3f83dd-6dfb-4127-a87f-c1714bd4fac9" providerId="ADAL" clId="{AFF27697-9E3A-4005-950E-2DF0D8510B4B}" dt="2022-12-12T17:56:16.839" v="0" actId="20577"/>
+          <ac:spMkLst>
+            <pc:docMk/>
+            <pc:sldMk cId="0" sldId="257"/>
+            <ac:spMk id="363523" creationId="{00000000-0000-0000-0000-000000000000}"/>
+          </ac:spMkLst>
+        </pc:spChg>
+      </pc:sldChg>
+    </pc:docChg>
+  </pc:docChgLst>
   <pc:docChgLst>
     <pc:chgData name="Hewner, Mike" userId="7f3f83dd-6dfb-4127-a87f-c1714bd4fac9" providerId="ADAL" clId="{7D444C9A-744F-497D-9BD7-A6A6E6B61E6B}"/>
     <pc:docChg chg="custSel addSld delSld modSld">
@@ -7198,10 +7222,6 @@
                 <a:spcPct val="90000"/>
               </a:lnSpc>
             </a:pPr>
-            <a:r>
-              <a:rPr lang="en-US" sz="4400" dirty="0"/>
-              <a:t>ArrayList exercise</a:t>
-            </a:r>
             <a:br>
               <a:rPr lang="en-US" sz="4400" dirty="0"/>
             </a:br>

</xml_diff>